<commit_message>
created Add appointment feature
</commit_message>
<xml_diff>
--- a/docs/diagrams/UiComponentClassDiagram.pptx
+++ b/docs/diagrams/UiComponentClassDiagram.pptx
@@ -208,7 +208,7 @@
           <a:p>
             <a:fld id="{F5CC4B3F-88C1-4FFA-B1B6-F41C21DC6924}" type="datetimeFigureOut">
               <a:rPr lang="en-US" smtClean="0"/>
-              <a:t>1/7/2017</a:t>
+              <a:t>4/15/18</a:t>
             </a:fld>
             <a:endParaRPr lang="en-US"/>
           </a:p>
@@ -654,7 +654,7 @@
           <a:p>
             <a:fld id="{78C97017-6FC3-485B-9764-EAC9E56C1D49}" type="datetimeFigureOut">
               <a:rPr lang="en-US" smtClean="0"/>
-              <a:t>1/7/2017</a:t>
+              <a:t>4/15/18</a:t>
             </a:fld>
             <a:endParaRPr lang="en-US"/>
           </a:p>
@@ -822,7 +822,7 @@
           <a:p>
             <a:fld id="{78C97017-6FC3-485B-9764-EAC9E56C1D49}" type="datetimeFigureOut">
               <a:rPr lang="en-US" smtClean="0"/>
-              <a:t>1/7/2017</a:t>
+              <a:t>4/15/18</a:t>
             </a:fld>
             <a:endParaRPr lang="en-US"/>
           </a:p>
@@ -1000,7 +1000,7 @@
           <a:p>
             <a:fld id="{78C97017-6FC3-485B-9764-EAC9E56C1D49}" type="datetimeFigureOut">
               <a:rPr lang="en-US" smtClean="0"/>
-              <a:t>1/7/2017</a:t>
+              <a:t>4/15/18</a:t>
             </a:fld>
             <a:endParaRPr lang="en-US"/>
           </a:p>
@@ -1168,7 +1168,7 @@
           <a:p>
             <a:fld id="{78C97017-6FC3-485B-9764-EAC9E56C1D49}" type="datetimeFigureOut">
               <a:rPr lang="en-US" smtClean="0"/>
-              <a:t>1/7/2017</a:t>
+              <a:t>4/15/18</a:t>
             </a:fld>
             <a:endParaRPr lang="en-US"/>
           </a:p>
@@ -1413,7 +1413,7 @@
           <a:p>
             <a:fld id="{78C97017-6FC3-485B-9764-EAC9E56C1D49}" type="datetimeFigureOut">
               <a:rPr lang="en-US" smtClean="0"/>
-              <a:t>1/7/2017</a:t>
+              <a:t>4/15/18</a:t>
             </a:fld>
             <a:endParaRPr lang="en-US"/>
           </a:p>
@@ -1698,7 +1698,7 @@
           <a:p>
             <a:fld id="{78C97017-6FC3-485B-9764-EAC9E56C1D49}" type="datetimeFigureOut">
               <a:rPr lang="en-US" smtClean="0"/>
-              <a:t>1/7/2017</a:t>
+              <a:t>4/15/18</a:t>
             </a:fld>
             <a:endParaRPr lang="en-US"/>
           </a:p>
@@ -2117,7 +2117,7 @@
           <a:p>
             <a:fld id="{78C97017-6FC3-485B-9764-EAC9E56C1D49}" type="datetimeFigureOut">
               <a:rPr lang="en-US" smtClean="0"/>
-              <a:t>1/7/2017</a:t>
+              <a:t>4/15/18</a:t>
             </a:fld>
             <a:endParaRPr lang="en-US"/>
           </a:p>
@@ -2234,7 +2234,7 @@
           <a:p>
             <a:fld id="{78C97017-6FC3-485B-9764-EAC9E56C1D49}" type="datetimeFigureOut">
               <a:rPr lang="en-US" smtClean="0"/>
-              <a:t>1/7/2017</a:t>
+              <a:t>4/15/18</a:t>
             </a:fld>
             <a:endParaRPr lang="en-US"/>
           </a:p>
@@ -2329,7 +2329,7 @@
           <a:p>
             <a:fld id="{78C97017-6FC3-485B-9764-EAC9E56C1D49}" type="datetimeFigureOut">
               <a:rPr lang="en-US" smtClean="0"/>
-              <a:t>1/7/2017</a:t>
+              <a:t>4/15/18</a:t>
             </a:fld>
             <a:endParaRPr lang="en-US"/>
           </a:p>
@@ -2604,7 +2604,7 @@
           <a:p>
             <a:fld id="{78C97017-6FC3-485B-9764-EAC9E56C1D49}" type="datetimeFigureOut">
               <a:rPr lang="en-US" smtClean="0"/>
-              <a:t>1/7/2017</a:t>
+              <a:t>4/15/18</a:t>
             </a:fld>
             <a:endParaRPr lang="en-US"/>
           </a:p>
@@ -2856,7 +2856,7 @@
           <a:p>
             <a:fld id="{78C97017-6FC3-485B-9764-EAC9E56C1D49}" type="datetimeFigureOut">
               <a:rPr lang="en-US" smtClean="0"/>
-              <a:t>1/7/2017</a:t>
+              <a:t>4/15/18</a:t>
             </a:fld>
             <a:endParaRPr lang="en-US"/>
           </a:p>
@@ -3067,7 +3067,7 @@
           <a:p>
             <a:fld id="{78C97017-6FC3-485B-9764-EAC9E56C1D49}" type="datetimeFigureOut">
               <a:rPr lang="en-US" smtClean="0"/>
-              <a:t>1/7/2017</a:t>
+              <a:t>4/15/18</a:t>
             </a:fld>
             <a:endParaRPr lang="en-US"/>
           </a:p>
@@ -3444,135 +3444,13 @@
       </p:grpSpPr>
       <p:sp>
         <p:nvSpPr>
-          <p:cNvPr id="23" name="Rectangle 65"/>
-          <p:cNvSpPr/>
-          <p:nvPr/>
-        </p:nvSpPr>
-        <p:spPr>
-          <a:xfrm>
-            <a:off x="1217465" y="1447800"/>
-            <a:ext cx="4917083" cy="3962400"/>
-          </a:xfrm>
-          <a:prstGeom prst="roundRect">
-            <a:avLst>
-              <a:gd name="adj" fmla="val 3484"/>
-            </a:avLst>
-          </a:prstGeom>
-          <a:solidFill>
-            <a:srgbClr val="F1F5E9"/>
-          </a:solidFill>
-          <a:ln w="19050">
-            <a:noFill/>
-          </a:ln>
-          <a:effectLst/>
-        </p:spPr>
-        <p:style>
-          <a:lnRef idx="1">
-            <a:schemeClr val="accent2"/>
-          </a:lnRef>
-          <a:fillRef idx="2">
-            <a:schemeClr val="accent2"/>
-          </a:fillRef>
-          <a:effectRef idx="1">
-            <a:schemeClr val="accent2"/>
-          </a:effectRef>
-          <a:fontRef idx="minor">
-            <a:schemeClr val="dk1"/>
-          </a:fontRef>
-        </p:style>
-        <p:txBody>
-          <a:bodyPr rtlCol="0" anchor="t"/>
-          <a:lstStyle/>
-          <a:p>
-            <a:r>
-              <a:rPr lang="en-US" sz="1200" b="1" dirty="0">
-                <a:solidFill>
-                  <a:schemeClr val="accent3">
-                    <a:lumMod val="75000"/>
-                  </a:schemeClr>
-                </a:solidFill>
-              </a:rPr>
-              <a:t>UI</a:t>
-            </a:r>
-            <a:endParaRPr lang="en-SG" sz="1200" b="1" dirty="0">
-              <a:solidFill>
-                <a:schemeClr val="accent3">
-                  <a:lumMod val="75000"/>
-                </a:schemeClr>
-              </a:solidFill>
-            </a:endParaRPr>
-          </a:p>
-        </p:txBody>
-      </p:sp>
-      <p:sp>
-        <p:nvSpPr>
-          <p:cNvPr id="2" name="Rectangle 8"/>
-          <p:cNvSpPr/>
-          <p:nvPr/>
-        </p:nvSpPr>
-        <p:spPr>
-          <a:xfrm>
-            <a:off x="2095948" y="2341220"/>
-            <a:ext cx="1093635" cy="346760"/>
-          </a:xfrm>
-          <a:prstGeom prst="rect">
-            <a:avLst/>
-          </a:prstGeom>
-          <a:ln w="19050">
-            <a:solidFill>
-              <a:schemeClr val="accent3"/>
-            </a:solidFill>
-          </a:ln>
-          <a:effectLst/>
-        </p:spPr>
-        <p:style>
-          <a:lnRef idx="1">
-            <a:schemeClr val="accent3"/>
-          </a:lnRef>
-          <a:fillRef idx="2">
-            <a:schemeClr val="accent3"/>
-          </a:fillRef>
-          <a:effectRef idx="1">
-            <a:schemeClr val="accent3"/>
-          </a:effectRef>
-          <a:fontRef idx="minor">
-            <a:schemeClr val="dk1"/>
-          </a:fontRef>
-        </p:style>
-        <p:txBody>
-          <a:bodyPr rtlCol="0" anchor="ctr"/>
-          <a:lstStyle/>
-          <a:p>
-            <a:pPr algn="ctr"/>
-            <a:r>
-              <a:rPr lang="en-US" sz="1050" b="1" dirty="0" err="1">
-                <a:solidFill>
-                  <a:schemeClr val="accent3">
-                    <a:lumMod val="75000"/>
-                  </a:schemeClr>
-                </a:solidFill>
-              </a:rPr>
-              <a:t>MainWindow</a:t>
-            </a:r>
-            <a:endParaRPr lang="en-SG" sz="1050" b="1" dirty="0">
-              <a:solidFill>
-                <a:schemeClr val="accent3">
-                  <a:lumMod val="75000"/>
-                </a:schemeClr>
-              </a:solidFill>
-            </a:endParaRPr>
-          </a:p>
-        </p:txBody>
-      </p:sp>
-      <p:sp>
-        <p:nvSpPr>
           <p:cNvPr id="3" name="Rectangle 11"/>
           <p:cNvSpPr/>
           <p:nvPr/>
         </p:nvSpPr>
         <p:spPr>
           <a:xfrm>
-            <a:off x="2592528" y="2971800"/>
+            <a:off x="4164165" y="1502759"/>
             <a:ext cx="1093635" cy="236841"/>
           </a:xfrm>
           <a:prstGeom prst="rect">
@@ -3612,163 +3490,13 @@
                   </a:schemeClr>
                 </a:solidFill>
               </a:rPr>
-              <a:t>CommandBox</a:t>
+              <a:t>Name</a:t>
             </a:r>
             <a:endParaRPr lang="en-SG" sz="1050" b="1" dirty="0">
               <a:solidFill>
                 <a:schemeClr val="accent3">
                   <a:lumMod val="75000"/>
                 </a:schemeClr>
-              </a:solidFill>
-            </a:endParaRPr>
-          </a:p>
-        </p:txBody>
-      </p:sp>
-      <p:sp>
-        <p:nvSpPr>
-          <p:cNvPr id="9" name="Rectangle 62"/>
-          <p:cNvSpPr/>
-          <p:nvPr/>
-        </p:nvSpPr>
-        <p:spPr>
-          <a:xfrm>
-            <a:off x="2092842" y="1770924"/>
-            <a:ext cx="1093635" cy="346760"/>
-          </a:xfrm>
-          <a:prstGeom prst="rect">
-            <a:avLst/>
-          </a:prstGeom>
-          <a:solidFill>
-            <a:srgbClr val="00B050"/>
-          </a:solidFill>
-          <a:ln w="19050">
-            <a:solidFill>
-              <a:srgbClr val="00B050"/>
-            </a:solidFill>
-          </a:ln>
-          <a:effectLst/>
-        </p:spPr>
-        <p:style>
-          <a:lnRef idx="1">
-            <a:schemeClr val="accent2"/>
-          </a:lnRef>
-          <a:fillRef idx="2">
-            <a:schemeClr val="accent2"/>
-          </a:fillRef>
-          <a:effectRef idx="1">
-            <a:schemeClr val="accent2"/>
-          </a:effectRef>
-          <a:fontRef idx="minor">
-            <a:schemeClr val="dk1"/>
-          </a:fontRef>
-        </p:style>
-        <p:txBody>
-          <a:bodyPr rtlCol="0" anchor="ctr"/>
-          <a:lstStyle/>
-          <a:p>
-            <a:pPr algn="ctr"/>
-            <a:r>
-              <a:rPr lang="en-US" sz="1050" dirty="0" err="1">
-                <a:solidFill>
-                  <a:schemeClr val="bg1"/>
-                </a:solidFill>
-              </a:rPr>
-              <a:t>UiManager</a:t>
-            </a:r>
-            <a:endParaRPr lang="en-SG" sz="1050" dirty="0">
-              <a:solidFill>
-                <a:schemeClr val="bg1"/>
-              </a:solidFill>
-            </a:endParaRPr>
-          </a:p>
-        </p:txBody>
-      </p:sp>
-      <p:cxnSp>
-        <p:nvCxnSpPr>
-          <p:cNvPr id="10" name="Elbow Connector 63"/>
-          <p:cNvCxnSpPr>
-            <a:stCxn id="9" idx="2"/>
-            <a:endCxn id="2" idx="0"/>
-          </p:cNvCxnSpPr>
-          <p:nvPr/>
-        </p:nvCxnSpPr>
-        <p:spPr>
-          <a:xfrm rot="16200000" flipH="1">
-            <a:off x="2529445" y="2227899"/>
-            <a:ext cx="223536" cy="3106"/>
-          </a:xfrm>
-          <a:prstGeom prst="bentConnector3">
-            <a:avLst>
-              <a:gd name="adj1" fmla="val 50000"/>
-            </a:avLst>
-          </a:prstGeom>
-          <a:ln w="19050">
-            <a:solidFill>
-              <a:srgbClr val="00B050"/>
-            </a:solidFill>
-            <a:headEnd type="none" w="med" len="med"/>
-            <a:tailEnd type="arrow" w="med" len="med"/>
-          </a:ln>
-          <a:effectLst/>
-        </p:spPr>
-        <p:style>
-          <a:lnRef idx="1">
-            <a:schemeClr val="accent2"/>
-          </a:lnRef>
-          <a:fillRef idx="2">
-            <a:schemeClr val="accent2"/>
-          </a:fillRef>
-          <a:effectRef idx="1">
-            <a:schemeClr val="accent2"/>
-          </a:effectRef>
-          <a:fontRef idx="minor">
-            <a:schemeClr val="dk1"/>
-          </a:fontRef>
-        </p:style>
-      </p:cxnSp>
-      <p:sp>
-        <p:nvSpPr>
-          <p:cNvPr id="16" name="Isosceles Triangle 102"/>
-          <p:cNvSpPr/>
-          <p:nvPr/>
-        </p:nvSpPr>
-        <p:spPr>
-          <a:xfrm rot="10800000" flipV="1">
-            <a:off x="5394717" y="2110477"/>
-            <a:ext cx="270504" cy="175523"/>
-          </a:xfrm>
-          <a:prstGeom prst="triangle">
-            <a:avLst/>
-          </a:prstGeom>
-          <a:ln w="6350">
-            <a:solidFill>
-              <a:schemeClr val="accent3"/>
-            </a:solidFill>
-          </a:ln>
-          <a:effectLst/>
-        </p:spPr>
-        <p:style>
-          <a:lnRef idx="1">
-            <a:schemeClr val="accent3"/>
-          </a:lnRef>
-          <a:fillRef idx="2">
-            <a:schemeClr val="accent3"/>
-          </a:fillRef>
-          <a:effectRef idx="1">
-            <a:schemeClr val="accent3"/>
-          </a:effectRef>
-          <a:fontRef idx="minor">
-            <a:schemeClr val="dk1"/>
-          </a:fontRef>
-        </p:style>
-        <p:txBody>
-          <a:bodyPr rtlCol="0" anchor="ctr"/>
-          <a:lstStyle/>
-          <a:p>
-            <a:pPr algn="ctr"/>
-            <a:endParaRPr lang="en-SG" sz="1050" b="1">
-              <a:solidFill>
-                <a:srgbClr val="92D050"/>
               </a:solidFill>
             </a:endParaRPr>
           </a:p>
@@ -3782,7 +3510,7 @@
         </p:nvCxnSpPr>
         <p:spPr>
           <a:xfrm flipV="1">
-            <a:off x="644735" y="2991937"/>
+            <a:off x="303968" y="2417158"/>
             <a:ext cx="684904" cy="1"/>
           </a:xfrm>
           <a:prstGeom prst="bentConnector3">
@@ -3819,73 +3547,13 @@
       </p:cxnSp>
       <p:sp>
         <p:nvSpPr>
-          <p:cNvPr id="22" name="Rectangle 65"/>
-          <p:cNvSpPr/>
-          <p:nvPr/>
-        </p:nvSpPr>
-        <p:spPr>
-          <a:xfrm rot="16200000">
-            <a:off x="5703829" y="2464877"/>
-            <a:ext cx="2362201" cy="328045"/>
-          </a:xfrm>
-          <a:prstGeom prst="roundRect">
-            <a:avLst/>
-          </a:prstGeom>
-          <a:solidFill>
-            <a:schemeClr val="accent1">
-              <a:lumMod val="20000"/>
-              <a:lumOff val="80000"/>
-            </a:schemeClr>
-          </a:solidFill>
-          <a:ln w="19050">
-            <a:noFill/>
-          </a:ln>
-          <a:effectLst/>
-        </p:spPr>
-        <p:style>
-          <a:lnRef idx="1">
-            <a:schemeClr val="accent2"/>
-          </a:lnRef>
-          <a:fillRef idx="2">
-            <a:schemeClr val="accent2"/>
-          </a:fillRef>
-          <a:effectRef idx="1">
-            <a:schemeClr val="accent2"/>
-          </a:effectRef>
-          <a:fontRef idx="minor">
-            <a:schemeClr val="dk1"/>
-          </a:fontRef>
-        </p:style>
-        <p:txBody>
-          <a:bodyPr rtlCol="0" anchor="ctr"/>
-          <a:lstStyle/>
-          <a:p>
-            <a:pPr algn="ctr"/>
-            <a:r>
-              <a:rPr lang="en-US" sz="1100" b="1" dirty="0">
-                <a:solidFill>
-                  <a:schemeClr val="bg1"/>
-                </a:solidFill>
-              </a:rPr>
-              <a:t>Logic</a:t>
-            </a:r>
-            <a:endParaRPr lang="en-SG" sz="1100" b="1" dirty="0">
-              <a:solidFill>
-                <a:schemeClr val="bg1"/>
-              </a:solidFill>
-            </a:endParaRPr>
-          </a:p>
-        </p:txBody>
-      </p:sp>
-      <p:sp>
-        <p:nvSpPr>
           <p:cNvPr id="34" name="Rectangle 11"/>
           <p:cNvSpPr/>
           <p:nvPr/>
         </p:nvSpPr>
         <p:spPr>
           <a:xfrm>
-            <a:off x="2592528" y="3649359"/>
+            <a:off x="4164165" y="2180318"/>
             <a:ext cx="1093635" cy="236841"/>
           </a:xfrm>
           <a:prstGeom prst="rect">
@@ -3925,7 +3593,7 @@
                   </a:schemeClr>
                 </a:solidFill>
               </a:rPr>
-              <a:t>BrowserPanel</a:t>
+              <a:t>Email</a:t>
             </a:r>
             <a:endParaRPr lang="en-SG" sz="1050" b="1" dirty="0">
               <a:solidFill>
@@ -3945,7 +3613,67 @@
         </p:nvSpPr>
         <p:spPr>
           <a:xfrm>
-            <a:off x="2592527" y="4563759"/>
+            <a:off x="4147799" y="3252738"/>
+            <a:ext cx="1398436" cy="333879"/>
+          </a:xfrm>
+          <a:prstGeom prst="rect">
+            <a:avLst/>
+          </a:prstGeom>
+          <a:ln w="19050">
+            <a:solidFill>
+              <a:schemeClr val="accent3"/>
+            </a:solidFill>
+          </a:ln>
+          <a:effectLst/>
+        </p:spPr>
+        <p:style>
+          <a:lnRef idx="1">
+            <a:schemeClr val="accent3"/>
+          </a:lnRef>
+          <a:fillRef idx="2">
+            <a:schemeClr val="accent3"/>
+          </a:fillRef>
+          <a:effectRef idx="1">
+            <a:schemeClr val="accent3"/>
+          </a:effectRef>
+          <a:fontRef idx="minor">
+            <a:schemeClr val="dk1"/>
+          </a:fontRef>
+        </p:style>
+        <p:txBody>
+          <a:bodyPr rtlCol="0" anchor="ctr"/>
+          <a:lstStyle/>
+          <a:p>
+            <a:pPr algn="ctr"/>
+            <a:r>
+              <a:rPr lang="en-US" sz="1050" b="1" dirty="0" err="1">
+                <a:solidFill>
+                  <a:schemeClr val="accent3">
+                    <a:lumMod val="75000"/>
+                  </a:schemeClr>
+                </a:solidFill>
+              </a:rPr>
+              <a:t>AppointmentList</a:t>
+            </a:r>
+            <a:endParaRPr lang="en-SG" sz="1050" b="1" dirty="0">
+              <a:solidFill>
+                <a:schemeClr val="accent3">
+                  <a:lumMod val="75000"/>
+                </a:schemeClr>
+              </a:solidFill>
+            </a:endParaRPr>
+          </a:p>
+        </p:txBody>
+      </p:sp>
+      <p:sp>
+        <p:nvSpPr>
+          <p:cNvPr id="36" name="Rectangle 11"/>
+          <p:cNvSpPr/>
+          <p:nvPr/>
+        </p:nvSpPr>
+        <p:spPr>
+          <a:xfrm>
+            <a:off x="4164163" y="2522919"/>
             <a:ext cx="1093635" cy="236841"/>
           </a:xfrm>
           <a:prstGeom prst="rect">
@@ -3985,7 +3713,7 @@
                   </a:schemeClr>
                 </a:solidFill>
               </a:rPr>
-              <a:t>StatusBarFooter</a:t>
+              <a:t>Address</a:t>
             </a:r>
             <a:endParaRPr lang="en-SG" sz="1050" b="1" dirty="0">
               <a:solidFill>
@@ -3999,193 +3727,13 @@
       </p:sp>
       <p:sp>
         <p:nvSpPr>
-          <p:cNvPr id="36" name="Rectangle 11"/>
-          <p:cNvSpPr/>
-          <p:nvPr/>
-        </p:nvSpPr>
-        <p:spPr>
-          <a:xfrm>
-            <a:off x="2592526" y="3991960"/>
-            <a:ext cx="1093635" cy="236841"/>
-          </a:xfrm>
-          <a:prstGeom prst="rect">
-            <a:avLst/>
-          </a:prstGeom>
-          <a:ln w="19050">
-            <a:solidFill>
-              <a:schemeClr val="accent3"/>
-            </a:solidFill>
-          </a:ln>
-          <a:effectLst/>
-        </p:spPr>
-        <p:style>
-          <a:lnRef idx="1">
-            <a:schemeClr val="accent3"/>
-          </a:lnRef>
-          <a:fillRef idx="2">
-            <a:schemeClr val="accent3"/>
-          </a:fillRef>
-          <a:effectRef idx="1">
-            <a:schemeClr val="accent3"/>
-          </a:effectRef>
-          <a:fontRef idx="minor">
-            <a:schemeClr val="dk1"/>
-          </a:fontRef>
-        </p:style>
-        <p:txBody>
-          <a:bodyPr rtlCol="0" anchor="ctr"/>
-          <a:lstStyle/>
-          <a:p>
-            <a:pPr algn="ctr"/>
-            <a:r>
-              <a:rPr lang="en-US" sz="1050" b="1" dirty="0" err="1">
-                <a:solidFill>
-                  <a:schemeClr val="accent3">
-                    <a:lumMod val="75000"/>
-                  </a:schemeClr>
-                </a:solidFill>
-              </a:rPr>
-              <a:t>PersonListPanel</a:t>
-            </a:r>
-            <a:endParaRPr lang="en-SG" sz="1050" b="1" dirty="0">
-              <a:solidFill>
-                <a:schemeClr val="accent3">
-                  <a:lumMod val="75000"/>
-                </a:schemeClr>
-              </a:solidFill>
-            </a:endParaRPr>
-          </a:p>
-        </p:txBody>
-      </p:sp>
-      <p:sp>
-        <p:nvSpPr>
-          <p:cNvPr id="37" name="Rectangle 11"/>
-          <p:cNvSpPr/>
-          <p:nvPr/>
-        </p:nvSpPr>
-        <p:spPr>
-          <a:xfrm>
-            <a:off x="3839323" y="4228801"/>
-            <a:ext cx="1040906" cy="236841"/>
-          </a:xfrm>
-          <a:prstGeom prst="rect">
-            <a:avLst/>
-          </a:prstGeom>
-          <a:ln w="19050">
-            <a:solidFill>
-              <a:schemeClr val="accent3"/>
-            </a:solidFill>
-          </a:ln>
-          <a:effectLst/>
-        </p:spPr>
-        <p:style>
-          <a:lnRef idx="1">
-            <a:schemeClr val="accent3"/>
-          </a:lnRef>
-          <a:fillRef idx="2">
-            <a:schemeClr val="accent3"/>
-          </a:fillRef>
-          <a:effectRef idx="1">
-            <a:schemeClr val="accent3"/>
-          </a:effectRef>
-          <a:fontRef idx="minor">
-            <a:schemeClr val="dk1"/>
-          </a:fontRef>
-        </p:style>
-        <p:txBody>
-          <a:bodyPr rtlCol="0" anchor="ctr"/>
-          <a:lstStyle/>
-          <a:p>
-            <a:pPr algn="ctr"/>
-            <a:r>
-              <a:rPr lang="en-US" sz="1050" b="1" dirty="0" err="1">
-                <a:solidFill>
-                  <a:schemeClr val="accent3">
-                    <a:lumMod val="75000"/>
-                  </a:schemeClr>
-                </a:solidFill>
-              </a:rPr>
-              <a:t>PersonCard</a:t>
-            </a:r>
-            <a:endParaRPr lang="en-SG" sz="1050" b="1" dirty="0">
-              <a:solidFill>
-                <a:schemeClr val="accent3">
-                  <a:lumMod val="75000"/>
-                </a:schemeClr>
-              </a:solidFill>
-            </a:endParaRPr>
-          </a:p>
-        </p:txBody>
-      </p:sp>
-      <p:sp>
-        <p:nvSpPr>
-          <p:cNvPr id="38" name="Rectangle 11"/>
-          <p:cNvSpPr/>
-          <p:nvPr/>
-        </p:nvSpPr>
-        <p:spPr>
-          <a:xfrm>
-            <a:off x="2592528" y="4966000"/>
-            <a:ext cx="1093635" cy="236841"/>
-          </a:xfrm>
-          <a:prstGeom prst="rect">
-            <a:avLst/>
-          </a:prstGeom>
-          <a:ln w="19050">
-            <a:solidFill>
-              <a:schemeClr val="accent3"/>
-            </a:solidFill>
-          </a:ln>
-          <a:effectLst/>
-        </p:spPr>
-        <p:style>
-          <a:lnRef idx="1">
-            <a:schemeClr val="accent3"/>
-          </a:lnRef>
-          <a:fillRef idx="2">
-            <a:schemeClr val="accent3"/>
-          </a:fillRef>
-          <a:effectRef idx="1">
-            <a:schemeClr val="accent3"/>
-          </a:effectRef>
-          <a:fontRef idx="minor">
-            <a:schemeClr val="dk1"/>
-          </a:fontRef>
-        </p:style>
-        <p:txBody>
-          <a:bodyPr rtlCol="0" anchor="ctr"/>
-          <a:lstStyle/>
-          <a:p>
-            <a:pPr algn="ctr"/>
-            <a:r>
-              <a:rPr lang="en-US" sz="1050" b="1" dirty="0" err="1">
-                <a:solidFill>
-                  <a:schemeClr val="accent3">
-                    <a:lumMod val="75000"/>
-                  </a:schemeClr>
-                </a:solidFill>
-              </a:rPr>
-              <a:t>HelpWindow</a:t>
-            </a:r>
-            <a:endParaRPr lang="en-SG" sz="1050" b="1" dirty="0">
-              <a:solidFill>
-                <a:schemeClr val="accent3">
-                  <a:lumMod val="75000"/>
-                </a:schemeClr>
-              </a:solidFill>
-            </a:endParaRPr>
-          </a:p>
-        </p:txBody>
-      </p:sp>
-      <p:sp>
-        <p:nvSpPr>
           <p:cNvPr id="39" name="Flowchart: Decision 38"/>
           <p:cNvSpPr/>
           <p:nvPr/>
         </p:nvSpPr>
         <p:spPr>
           <a:xfrm>
-            <a:off x="2324548" y="2706452"/>
+            <a:off x="1676400" y="2915505"/>
             <a:ext cx="183156" cy="161573"/>
           </a:xfrm>
           <a:prstGeom prst="flowChartDecision">
@@ -4235,12 +3783,15 @@
           <p:nvPr/>
         </p:nvCxnSpPr>
         <p:spPr>
-          <a:xfrm rot="16200000" flipH="1">
-            <a:off x="2393229" y="2890922"/>
-            <a:ext cx="222196" cy="176402"/>
+          <a:xfrm rot="5400000" flipH="1" flipV="1">
+            <a:off x="2238122" y="1151035"/>
+            <a:ext cx="1455898" cy="2396187"/>
           </a:xfrm>
-          <a:prstGeom prst="bentConnector2">
-            <a:avLst/>
+          <a:prstGeom prst="bentConnector4">
+            <a:avLst>
+              <a:gd name="adj1" fmla="val -15702"/>
+              <a:gd name="adj2" fmla="val 51911"/>
+            </a:avLst>
           </a:prstGeom>
           <a:ln w="19050">
             <a:solidFill>
@@ -4274,7 +3825,7 @@
         </p:nvSpPr>
         <p:spPr>
           <a:xfrm>
-            <a:off x="2590799" y="3304308"/>
+            <a:off x="4162436" y="1835267"/>
             <a:ext cx="1095361" cy="236841"/>
           </a:xfrm>
           <a:prstGeom prst="rect">
@@ -4314,7 +3865,7 @@
                   </a:schemeClr>
                 </a:solidFill>
               </a:rPr>
-              <a:t>ResultDisplay</a:t>
+              <a:t>Phone</a:t>
             </a:r>
             <a:endParaRPr lang="en-SG" sz="1050" b="1" dirty="0">
               <a:solidFill>
@@ -4336,12 +3887,15 @@
           <p:nvPr/>
         </p:nvCxnSpPr>
         <p:spPr>
-          <a:xfrm rot="16200000" flipH="1">
-            <a:off x="2054450" y="3229701"/>
-            <a:ext cx="899755" cy="176402"/>
+          <a:xfrm rot="5400000" flipH="1" flipV="1">
+            <a:off x="2576901" y="1489815"/>
+            <a:ext cx="778339" cy="2396187"/>
           </a:xfrm>
-          <a:prstGeom prst="bentConnector2">
-            <a:avLst/>
+          <a:prstGeom prst="bentConnector4">
+            <a:avLst>
+              <a:gd name="adj1" fmla="val -29370"/>
+              <a:gd name="adj2" fmla="val 51911"/>
+            </a:avLst>
           </a:prstGeom>
           <a:ln w="19050">
             <a:solidFill>
@@ -4377,12 +3931,15 @@
           <p:nvPr/>
         </p:nvCxnSpPr>
         <p:spPr>
-          <a:xfrm rot="16200000" flipH="1">
-            <a:off x="1883148" y="3401003"/>
-            <a:ext cx="1242356" cy="176400"/>
+          <a:xfrm rot="5400000" flipH="1" flipV="1">
+            <a:off x="2748201" y="1661116"/>
+            <a:ext cx="435738" cy="2396185"/>
           </a:xfrm>
-          <a:prstGeom prst="bentConnector2">
-            <a:avLst/>
+          <a:prstGeom prst="bentConnector4">
+            <a:avLst>
+              <a:gd name="adj1" fmla="val -52463"/>
+              <a:gd name="adj2" fmla="val 51911"/>
+            </a:avLst>
           </a:prstGeom>
           <a:ln w="19050">
             <a:solidFill>
@@ -4412,15 +3969,14 @@
         <p:nvCxnSpPr>
           <p:cNvPr id="50" name="Elbow Connector 63"/>
           <p:cNvCxnSpPr>
-            <a:stCxn id="39" idx="2"/>
-            <a:endCxn id="35" idx="1"/>
+            <a:cxnSpLocks/>
           </p:cNvCxnSpPr>
           <p:nvPr/>
         </p:nvCxnSpPr>
         <p:spPr>
           <a:xfrm rot="16200000" flipH="1">
-            <a:off x="1597249" y="3686901"/>
-            <a:ext cx="1814155" cy="176401"/>
+            <a:off x="2786589" y="1963368"/>
+            <a:ext cx="342600" cy="2379821"/>
           </a:xfrm>
           <a:prstGeom prst="bentConnector2">
             <a:avLst/>
@@ -4449,472 +4005,6 @@
           </a:fontRef>
         </p:style>
       </p:cxnSp>
-      <p:cxnSp>
-        <p:nvCxnSpPr>
-          <p:cNvPr id="53" name="Elbow Connector 63"/>
-          <p:cNvCxnSpPr>
-            <a:endCxn id="38" idx="1"/>
-          </p:cNvCxnSpPr>
-          <p:nvPr/>
-        </p:nvCxnSpPr>
-        <p:spPr>
-          <a:xfrm rot="16200000" flipH="1">
-            <a:off x="1184119" y="3676012"/>
-            <a:ext cx="2396440" cy="420377"/>
-          </a:xfrm>
-          <a:prstGeom prst="bentConnector2">
-            <a:avLst/>
-          </a:prstGeom>
-          <a:ln w="19050">
-            <a:solidFill>
-              <a:schemeClr val="accent3"/>
-            </a:solidFill>
-            <a:headEnd type="none" w="med" len="med"/>
-            <a:tailEnd type="arrow" w="med" len="med"/>
-          </a:ln>
-          <a:effectLst/>
-        </p:spPr>
-        <p:style>
-          <a:lnRef idx="1">
-            <a:schemeClr val="accent2"/>
-          </a:lnRef>
-          <a:fillRef idx="2">
-            <a:schemeClr val="accent2"/>
-          </a:fillRef>
-          <a:effectRef idx="1">
-            <a:schemeClr val="accent2"/>
-          </a:effectRef>
-          <a:fontRef idx="minor">
-            <a:schemeClr val="dk1"/>
-          </a:fontRef>
-        </p:style>
-      </p:cxnSp>
-      <p:sp>
-        <p:nvSpPr>
-          <p:cNvPr id="73" name="Rectangle 62"/>
-          <p:cNvSpPr/>
-          <p:nvPr/>
-        </p:nvSpPr>
-        <p:spPr>
-          <a:xfrm>
-            <a:off x="5143948" y="1770924"/>
-            <a:ext cx="772043" cy="346760"/>
-          </a:xfrm>
-          <a:prstGeom prst="rect">
-            <a:avLst/>
-          </a:prstGeom>
-          <a:ln w="6350">
-            <a:solidFill>
-              <a:schemeClr val="accent3"/>
-            </a:solidFill>
-          </a:ln>
-          <a:effectLst/>
-        </p:spPr>
-        <p:style>
-          <a:lnRef idx="1">
-            <a:schemeClr val="accent3"/>
-          </a:lnRef>
-          <a:fillRef idx="2">
-            <a:schemeClr val="accent3"/>
-          </a:fillRef>
-          <a:effectRef idx="1">
-            <a:schemeClr val="accent3"/>
-          </a:effectRef>
-          <a:fontRef idx="minor">
-            <a:schemeClr val="dk1"/>
-          </a:fontRef>
-        </p:style>
-        <p:txBody>
-          <a:bodyPr rtlCol="0" anchor="ctr"/>
-          <a:lstStyle/>
-          <a:p>
-            <a:pPr algn="ctr"/>
-            <a:r>
-              <a:rPr lang="en-US" sz="1050" b="1" dirty="0">
-                <a:solidFill>
-                  <a:schemeClr val="accent3">
-                    <a:lumMod val="75000"/>
-                  </a:schemeClr>
-                </a:solidFill>
-              </a:rPr>
-              <a:t>{abstract}</a:t>
-            </a:r>
-            <a:br>
-              <a:rPr lang="en-US" sz="1050" b="1" dirty="0">
-                <a:solidFill>
-                  <a:schemeClr val="accent3">
-                    <a:lumMod val="75000"/>
-                  </a:schemeClr>
-                </a:solidFill>
-              </a:rPr>
-            </a:br>
-            <a:r>
-              <a:rPr lang="en-US" sz="1050" b="1" dirty="0" err="1">
-                <a:solidFill>
-                  <a:schemeClr val="accent3">
-                    <a:lumMod val="75000"/>
-                  </a:schemeClr>
-                </a:solidFill>
-              </a:rPr>
-              <a:t>UiPart</a:t>
-            </a:r>
-            <a:endParaRPr lang="en-SG" sz="1050" b="1" dirty="0">
-              <a:solidFill>
-                <a:schemeClr val="accent3">
-                  <a:lumMod val="75000"/>
-                </a:schemeClr>
-              </a:solidFill>
-            </a:endParaRPr>
-          </a:p>
-        </p:txBody>
-      </p:sp>
-      <p:cxnSp>
-        <p:nvCxnSpPr>
-          <p:cNvPr id="74" name="Elbow Connector 63"/>
-          <p:cNvCxnSpPr>
-            <a:stCxn id="43" idx="3"/>
-            <a:endCxn id="16" idx="3"/>
-          </p:cNvCxnSpPr>
-          <p:nvPr/>
-        </p:nvCxnSpPr>
-        <p:spPr>
-          <a:xfrm flipV="1">
-            <a:off x="3686160" y="2286000"/>
-            <a:ext cx="1843809" cy="1136729"/>
-          </a:xfrm>
-          <a:prstGeom prst="bentConnector2">
-            <a:avLst/>
-          </a:prstGeom>
-          <a:ln w="6350">
-            <a:solidFill>
-              <a:schemeClr val="accent3"/>
-            </a:solidFill>
-            <a:headEnd type="none" w="med" len="med"/>
-            <a:tailEnd type="none" w="med" len="med"/>
-          </a:ln>
-          <a:effectLst/>
-        </p:spPr>
-        <p:style>
-          <a:lnRef idx="1">
-            <a:schemeClr val="accent2"/>
-          </a:lnRef>
-          <a:fillRef idx="2">
-            <a:schemeClr val="accent2"/>
-          </a:fillRef>
-          <a:effectRef idx="1">
-            <a:schemeClr val="accent2"/>
-          </a:effectRef>
-          <a:fontRef idx="minor">
-            <a:schemeClr val="dk1"/>
-          </a:fontRef>
-        </p:style>
-      </p:cxnSp>
-      <p:cxnSp>
-        <p:nvCxnSpPr>
-          <p:cNvPr id="77" name="Elbow Connector 63"/>
-          <p:cNvCxnSpPr>
-            <a:stCxn id="16" idx="3"/>
-            <a:endCxn id="37" idx="3"/>
-          </p:cNvCxnSpPr>
-          <p:nvPr/>
-        </p:nvCxnSpPr>
-        <p:spPr>
-          <a:xfrm rot="5400000">
-            <a:off x="4174488" y="2991741"/>
-            <a:ext cx="2061222" cy="649740"/>
-          </a:xfrm>
-          <a:prstGeom prst="bentConnector2">
-            <a:avLst/>
-          </a:prstGeom>
-          <a:ln w="6350">
-            <a:solidFill>
-              <a:schemeClr val="accent3"/>
-            </a:solidFill>
-            <a:headEnd type="none" w="med" len="med"/>
-            <a:tailEnd type="none" w="med" len="med"/>
-          </a:ln>
-          <a:effectLst/>
-        </p:spPr>
-        <p:style>
-          <a:lnRef idx="1">
-            <a:schemeClr val="accent2"/>
-          </a:lnRef>
-          <a:fillRef idx="2">
-            <a:schemeClr val="accent2"/>
-          </a:fillRef>
-          <a:effectRef idx="1">
-            <a:schemeClr val="accent2"/>
-          </a:effectRef>
-          <a:fontRef idx="minor">
-            <a:schemeClr val="dk1"/>
-          </a:fontRef>
-        </p:style>
-      </p:cxnSp>
-      <p:cxnSp>
-        <p:nvCxnSpPr>
-          <p:cNvPr id="82" name="Elbow Connector 63"/>
-          <p:cNvCxnSpPr>
-            <a:stCxn id="16" idx="3"/>
-            <a:endCxn id="34" idx="3"/>
-          </p:cNvCxnSpPr>
-          <p:nvPr/>
-        </p:nvCxnSpPr>
-        <p:spPr>
-          <a:xfrm rot="5400000">
-            <a:off x="3867176" y="2104987"/>
-            <a:ext cx="1481780" cy="1843806"/>
-          </a:xfrm>
-          <a:prstGeom prst="bentConnector2">
-            <a:avLst/>
-          </a:prstGeom>
-          <a:ln w="6350">
-            <a:solidFill>
-              <a:schemeClr val="accent3"/>
-            </a:solidFill>
-            <a:headEnd type="none" w="med" len="med"/>
-            <a:tailEnd type="none" w="med" len="med"/>
-          </a:ln>
-          <a:effectLst/>
-        </p:spPr>
-        <p:style>
-          <a:lnRef idx="1">
-            <a:schemeClr val="accent2"/>
-          </a:lnRef>
-          <a:fillRef idx="2">
-            <a:schemeClr val="accent2"/>
-          </a:fillRef>
-          <a:effectRef idx="1">
-            <a:schemeClr val="accent2"/>
-          </a:effectRef>
-          <a:fontRef idx="minor">
-            <a:schemeClr val="dk1"/>
-          </a:fontRef>
-        </p:style>
-      </p:cxnSp>
-      <p:cxnSp>
-        <p:nvCxnSpPr>
-          <p:cNvPr id="88" name="Elbow Connector 63"/>
-          <p:cNvCxnSpPr>
-            <a:stCxn id="2" idx="3"/>
-            <a:endCxn id="16" idx="3"/>
-          </p:cNvCxnSpPr>
-          <p:nvPr/>
-        </p:nvCxnSpPr>
-        <p:spPr>
-          <a:xfrm flipV="1">
-            <a:off x="3189583" y="2286000"/>
-            <a:ext cx="2340386" cy="228600"/>
-          </a:xfrm>
-          <a:prstGeom prst="bentConnector2">
-            <a:avLst/>
-          </a:prstGeom>
-          <a:ln w="6350">
-            <a:solidFill>
-              <a:schemeClr val="accent3"/>
-            </a:solidFill>
-            <a:headEnd type="none" w="med" len="med"/>
-            <a:tailEnd type="none" w="med" len="med"/>
-          </a:ln>
-          <a:effectLst/>
-        </p:spPr>
-        <p:style>
-          <a:lnRef idx="1">
-            <a:schemeClr val="accent2"/>
-          </a:lnRef>
-          <a:fillRef idx="2">
-            <a:schemeClr val="accent2"/>
-          </a:fillRef>
-          <a:effectRef idx="1">
-            <a:schemeClr val="accent2"/>
-          </a:effectRef>
-          <a:fontRef idx="minor">
-            <a:schemeClr val="dk1"/>
-          </a:fontRef>
-        </p:style>
-      </p:cxnSp>
-      <p:cxnSp>
-        <p:nvCxnSpPr>
-          <p:cNvPr id="91" name="Elbow Connector 63"/>
-          <p:cNvCxnSpPr>
-            <a:stCxn id="16" idx="3"/>
-            <a:endCxn id="35" idx="3"/>
-          </p:cNvCxnSpPr>
-          <p:nvPr/>
-        </p:nvCxnSpPr>
-        <p:spPr>
-          <a:xfrm rot="5400000">
-            <a:off x="3409976" y="2562187"/>
-            <a:ext cx="2396180" cy="1843807"/>
-          </a:xfrm>
-          <a:prstGeom prst="bentConnector2">
-            <a:avLst/>
-          </a:prstGeom>
-          <a:ln w="6350">
-            <a:solidFill>
-              <a:schemeClr val="accent3"/>
-            </a:solidFill>
-            <a:headEnd type="none" w="med" len="med"/>
-            <a:tailEnd type="none" w="med" len="med"/>
-          </a:ln>
-          <a:effectLst/>
-        </p:spPr>
-        <p:style>
-          <a:lnRef idx="1">
-            <a:schemeClr val="accent2"/>
-          </a:lnRef>
-          <a:fillRef idx="2">
-            <a:schemeClr val="accent2"/>
-          </a:fillRef>
-          <a:effectRef idx="1">
-            <a:schemeClr val="accent2"/>
-          </a:effectRef>
-          <a:fontRef idx="minor">
-            <a:schemeClr val="dk1"/>
-          </a:fontRef>
-        </p:style>
-      </p:cxnSp>
-      <p:cxnSp>
-        <p:nvCxnSpPr>
-          <p:cNvPr id="94" name="Elbow Connector 63"/>
-          <p:cNvCxnSpPr>
-            <a:stCxn id="16" idx="3"/>
-            <a:endCxn id="38" idx="3"/>
-          </p:cNvCxnSpPr>
-          <p:nvPr/>
-        </p:nvCxnSpPr>
-        <p:spPr>
-          <a:xfrm rot="5400000">
-            <a:off x="3208856" y="2763307"/>
-            <a:ext cx="2798421" cy="1843806"/>
-          </a:xfrm>
-          <a:prstGeom prst="bentConnector2">
-            <a:avLst/>
-          </a:prstGeom>
-          <a:ln w="6350">
-            <a:solidFill>
-              <a:schemeClr val="accent3"/>
-            </a:solidFill>
-            <a:headEnd type="none" w="med" len="med"/>
-            <a:tailEnd type="none" w="med" len="med"/>
-          </a:ln>
-          <a:effectLst/>
-        </p:spPr>
-        <p:style>
-          <a:lnRef idx="1">
-            <a:schemeClr val="accent2"/>
-          </a:lnRef>
-          <a:fillRef idx="2">
-            <a:schemeClr val="accent2"/>
-          </a:fillRef>
-          <a:effectRef idx="1">
-            <a:schemeClr val="accent2"/>
-          </a:effectRef>
-          <a:fontRef idx="minor">
-            <a:schemeClr val="dk1"/>
-          </a:fontRef>
-        </p:style>
-      </p:cxnSp>
-      <p:cxnSp>
-        <p:nvCxnSpPr>
-          <p:cNvPr id="107" name="Elbow Connector 106"/>
-          <p:cNvCxnSpPr>
-            <a:stCxn id="9" idx="0"/>
-          </p:cNvCxnSpPr>
-          <p:nvPr/>
-        </p:nvCxnSpPr>
-        <p:spPr>
-          <a:xfrm rot="5400000" flipH="1" flipV="1">
-            <a:off x="4594921" y="-355061"/>
-            <a:ext cx="170724" cy="4081246"/>
-          </a:xfrm>
-          <a:prstGeom prst="bentConnector2">
-            <a:avLst/>
-          </a:prstGeom>
-          <a:ln w="19050">
-            <a:solidFill>
-              <a:srgbClr val="00B050"/>
-            </a:solidFill>
-            <a:prstDash val="solid"/>
-            <a:headEnd type="none" w="med" len="med"/>
-            <a:tailEnd type="arrow" w="med" len="med"/>
-          </a:ln>
-          <a:effectLst/>
-        </p:spPr>
-        <p:style>
-          <a:lnRef idx="1">
-            <a:schemeClr val="accent2"/>
-          </a:lnRef>
-          <a:fillRef idx="2">
-            <a:schemeClr val="accent2"/>
-          </a:fillRef>
-          <a:effectRef idx="1">
-            <a:schemeClr val="accent2"/>
-          </a:effectRef>
-          <a:fontRef idx="minor">
-            <a:schemeClr val="dk1"/>
-          </a:fontRef>
-        </p:style>
-      </p:cxnSp>
-      <p:sp>
-        <p:nvSpPr>
-          <p:cNvPr id="117" name="Rectangle 65"/>
-          <p:cNvSpPr/>
-          <p:nvPr/>
-        </p:nvSpPr>
-        <p:spPr>
-          <a:xfrm rot="16200000">
-            <a:off x="6213739" y="4560376"/>
-            <a:ext cx="1371599" cy="328045"/>
-          </a:xfrm>
-          <a:prstGeom prst="roundRect">
-            <a:avLst/>
-          </a:prstGeom>
-          <a:solidFill>
-            <a:schemeClr val="accent4">
-              <a:lumMod val="20000"/>
-              <a:lumOff val="80000"/>
-            </a:schemeClr>
-          </a:solidFill>
-          <a:ln w="19050">
-            <a:noFill/>
-          </a:ln>
-          <a:effectLst/>
-        </p:spPr>
-        <p:style>
-          <a:lnRef idx="1">
-            <a:schemeClr val="accent2"/>
-          </a:lnRef>
-          <a:fillRef idx="2">
-            <a:schemeClr val="accent2"/>
-          </a:fillRef>
-          <a:effectRef idx="1">
-            <a:schemeClr val="accent2"/>
-          </a:effectRef>
-          <a:fontRef idx="minor">
-            <a:schemeClr val="dk1"/>
-          </a:fontRef>
-        </p:style>
-        <p:txBody>
-          <a:bodyPr rtlCol="0" anchor="ctr"/>
-          <a:lstStyle/>
-          <a:p>
-            <a:pPr algn="ctr"/>
-            <a:r>
-              <a:rPr lang="en-US" sz="1100" b="1" dirty="0">
-                <a:solidFill>
-                  <a:schemeClr val="bg1"/>
-                </a:solidFill>
-              </a:rPr>
-              <a:t>Model</a:t>
-            </a:r>
-            <a:endParaRPr lang="en-SG" sz="1100" b="1" dirty="0">
-              <a:solidFill>
-                <a:schemeClr val="bg1"/>
-              </a:solidFill>
-            </a:endParaRPr>
-          </a:p>
-        </p:txBody>
-      </p:sp>
       <p:sp>
         <p:nvSpPr>
           <p:cNvPr id="119" name="Rectangle 62"/>
@@ -4923,8 +4013,8 @@
         </p:nvSpPr>
         <p:spPr>
           <a:xfrm rot="16200000">
-            <a:off x="956202" y="2861202"/>
-            <a:ext cx="1093635" cy="346760"/>
+            <a:off x="294180" y="2199179"/>
+            <a:ext cx="2078641" cy="685799"/>
           </a:xfrm>
           <a:prstGeom prst="rect">
             <a:avLst/>
@@ -4959,25 +4049,14 @@
           <a:p>
             <a:pPr algn="ctr"/>
             <a:r>
-              <a:rPr lang="en-US" sz="1050" dirty="0">
+              <a:rPr lang="en-US" b="1" dirty="0">
                 <a:solidFill>
                   <a:schemeClr val="bg1"/>
                 </a:solidFill>
               </a:rPr>
-              <a:t>&lt;&lt;interface&gt;&gt;</a:t>
-            </a:r>
-          </a:p>
-          <a:p>
-            <a:pPr algn="ctr"/>
-            <a:r>
-              <a:rPr lang="en-US" sz="1050" dirty="0" err="1">
-                <a:solidFill>
-                  <a:schemeClr val="bg1"/>
-                </a:solidFill>
-              </a:rPr>
-              <a:t>Ui</a:t>
-            </a:r>
-            <a:endParaRPr lang="en-SG" sz="1050" dirty="0">
+              <a:t>Person</a:t>
+            </a:r>
+            <a:endParaRPr lang="en-SG" b="1" dirty="0">
               <a:solidFill>
                 <a:schemeClr val="bg1"/>
               </a:solidFill>
@@ -4985,96 +4064,6 @@
           </a:p>
         </p:txBody>
       </p:sp>
-      <p:sp>
-        <p:nvSpPr>
-          <p:cNvPr id="120" name="Isosceles Triangle 102"/>
-          <p:cNvSpPr/>
-          <p:nvPr/>
-        </p:nvSpPr>
-        <p:spPr>
-          <a:xfrm flipV="1">
-            <a:off x="1367767" y="2286001"/>
-            <a:ext cx="270504" cy="175523"/>
-          </a:xfrm>
-          <a:prstGeom prst="triangle">
-            <a:avLst/>
-          </a:prstGeom>
-          <a:ln w="19050">
-            <a:solidFill>
-              <a:srgbClr val="00B050"/>
-            </a:solidFill>
-          </a:ln>
-          <a:effectLst/>
-        </p:spPr>
-        <p:style>
-          <a:lnRef idx="1">
-            <a:schemeClr val="accent3"/>
-          </a:lnRef>
-          <a:fillRef idx="2">
-            <a:schemeClr val="accent3"/>
-          </a:fillRef>
-          <a:effectRef idx="1">
-            <a:schemeClr val="accent3"/>
-          </a:effectRef>
-          <a:fontRef idx="minor">
-            <a:schemeClr val="dk1"/>
-          </a:fontRef>
-        </p:style>
-        <p:txBody>
-          <a:bodyPr rtlCol="0" anchor="ctr"/>
-          <a:lstStyle/>
-          <a:p>
-            <a:pPr algn="ctr"/>
-            <a:endParaRPr lang="en-SG" sz="1050" b="1">
-              <a:solidFill>
-                <a:srgbClr val="92D050"/>
-              </a:solidFill>
-            </a:endParaRPr>
-          </a:p>
-        </p:txBody>
-      </p:sp>
-      <p:cxnSp>
-        <p:nvCxnSpPr>
-          <p:cNvPr id="121" name="Elbow Connector 63"/>
-          <p:cNvCxnSpPr>
-            <a:stCxn id="9" idx="1"/>
-            <a:endCxn id="120" idx="3"/>
-          </p:cNvCxnSpPr>
-          <p:nvPr/>
-        </p:nvCxnSpPr>
-        <p:spPr>
-          <a:xfrm rot="10800000" flipV="1">
-            <a:off x="1503020" y="1944303"/>
-            <a:ext cx="589823" cy="341697"/>
-          </a:xfrm>
-          <a:prstGeom prst="bentConnector2">
-            <a:avLst/>
-          </a:prstGeom>
-          <a:ln w="19050">
-            <a:solidFill>
-              <a:srgbClr val="00B050"/>
-            </a:solidFill>
-            <a:prstDash val="sysDot"/>
-            <a:headEnd type="none" w="med" len="med"/>
-            <a:tailEnd type="none" w="med" len="med"/>
-          </a:ln>
-          <a:effectLst/>
-        </p:spPr>
-        <p:style>
-          <a:lnRef idx="1">
-            <a:schemeClr val="accent2"/>
-          </a:lnRef>
-          <a:fillRef idx="2">
-            <a:schemeClr val="accent2"/>
-          </a:fillRef>
-          <a:effectRef idx="1">
-            <a:schemeClr val="accent2"/>
-          </a:effectRef>
-          <a:fontRef idx="minor">
-            <a:schemeClr val="dk1"/>
-          </a:fontRef>
-        </p:style>
-      </p:cxnSp>
       <p:cxnSp>
         <p:nvCxnSpPr>
           <p:cNvPr id="131" name="Elbow Connector 130"/>
@@ -5085,12 +4074,15 @@
           <p:nvPr/>
         </p:nvCxnSpPr>
         <p:spPr>
-          <a:xfrm rot="16200000" flipH="1">
-            <a:off x="2226110" y="3058040"/>
-            <a:ext cx="554704" cy="174673"/>
+          <a:xfrm rot="5400000" flipH="1" flipV="1">
+            <a:off x="2403512" y="1318154"/>
+            <a:ext cx="1123390" cy="2394458"/>
           </a:xfrm>
-          <a:prstGeom prst="bentConnector2">
-            <a:avLst/>
+          <a:prstGeom prst="bentConnector4">
+            <a:avLst>
+              <a:gd name="adj1" fmla="val -20349"/>
+              <a:gd name="adj2" fmla="val 51912"/>
+            </a:avLst>
           </a:prstGeom>
           <a:ln w="19050">
             <a:solidFill>
@@ -5098,129 +4090,6 @@
             </a:solidFill>
             <a:headEnd type="none" w="med" len="med"/>
             <a:tailEnd type="arrow" w="med" len="med"/>
-          </a:ln>
-          <a:effectLst/>
-        </p:spPr>
-        <p:style>
-          <a:lnRef idx="1">
-            <a:schemeClr val="accent2"/>
-          </a:lnRef>
-          <a:fillRef idx="2">
-            <a:schemeClr val="accent2"/>
-          </a:fillRef>
-          <a:effectRef idx="1">
-            <a:schemeClr val="accent2"/>
-          </a:effectRef>
-          <a:fontRef idx="minor">
-            <a:schemeClr val="dk1"/>
-          </a:fontRef>
-        </p:style>
-      </p:cxnSp>
-      <p:cxnSp>
-        <p:nvCxnSpPr>
-          <p:cNvPr id="132" name="Elbow Connector 63"/>
-          <p:cNvCxnSpPr>
-            <a:stCxn id="16" idx="3"/>
-            <a:endCxn id="3" idx="3"/>
-          </p:cNvCxnSpPr>
-          <p:nvPr/>
-        </p:nvCxnSpPr>
-        <p:spPr>
-          <a:xfrm rot="5400000">
-            <a:off x="4205956" y="1766207"/>
-            <a:ext cx="804221" cy="1843806"/>
-          </a:xfrm>
-          <a:prstGeom prst="bentConnector2">
-            <a:avLst/>
-          </a:prstGeom>
-          <a:ln w="6350">
-            <a:solidFill>
-              <a:schemeClr val="accent3"/>
-            </a:solidFill>
-            <a:headEnd type="none" w="med" len="med"/>
-            <a:tailEnd type="none" w="med" len="med"/>
-          </a:ln>
-          <a:effectLst/>
-        </p:spPr>
-        <p:style>
-          <a:lnRef idx="1">
-            <a:schemeClr val="accent2"/>
-          </a:lnRef>
-          <a:fillRef idx="2">
-            <a:schemeClr val="accent2"/>
-          </a:fillRef>
-          <a:effectRef idx="1">
-            <a:schemeClr val="accent2"/>
-          </a:effectRef>
-          <a:fontRef idx="minor">
-            <a:schemeClr val="dk1"/>
-          </a:fontRef>
-        </p:style>
-      </p:cxnSp>
-      <p:cxnSp>
-        <p:nvCxnSpPr>
-          <p:cNvPr id="137" name="Elbow Connector 136"/>
-          <p:cNvCxnSpPr>
-            <a:stCxn id="36" idx="2"/>
-            <a:endCxn id="37" idx="1"/>
-          </p:cNvCxnSpPr>
-          <p:nvPr/>
-        </p:nvCxnSpPr>
-        <p:spPr>
-          <a:xfrm rot="16200000" flipH="1">
-            <a:off x="3430123" y="3938021"/>
-            <a:ext cx="118421" cy="699979"/>
-          </a:xfrm>
-          <a:prstGeom prst="bentConnector2">
-            <a:avLst/>
-          </a:prstGeom>
-          <a:ln w="19050">
-            <a:solidFill>
-              <a:schemeClr val="accent3"/>
-            </a:solidFill>
-            <a:headEnd type="none" w="med" len="med"/>
-            <a:tailEnd type="arrow" w="med" len="med"/>
-          </a:ln>
-          <a:effectLst/>
-        </p:spPr>
-        <p:style>
-          <a:lnRef idx="1">
-            <a:schemeClr val="accent2"/>
-          </a:lnRef>
-          <a:fillRef idx="2">
-            <a:schemeClr val="accent2"/>
-          </a:fillRef>
-          <a:effectRef idx="1">
-            <a:schemeClr val="accent2"/>
-          </a:effectRef>
-          <a:fontRef idx="minor">
-            <a:schemeClr val="dk1"/>
-          </a:fontRef>
-        </p:style>
-      </p:cxnSp>
-      <p:cxnSp>
-        <p:nvCxnSpPr>
-          <p:cNvPr id="140" name="Elbow Connector 63"/>
-          <p:cNvCxnSpPr>
-            <a:stCxn id="16" idx="3"/>
-            <a:endCxn id="36" idx="3"/>
-          </p:cNvCxnSpPr>
-          <p:nvPr/>
-        </p:nvCxnSpPr>
-        <p:spPr>
-          <a:xfrm rot="5400000">
-            <a:off x="3695875" y="2276286"/>
-            <a:ext cx="1824381" cy="1843808"/>
-          </a:xfrm>
-          <a:prstGeom prst="bentConnector2">
-            <a:avLst/>
-          </a:prstGeom>
-          <a:ln w="6350">
-            <a:solidFill>
-              <a:schemeClr val="accent3"/>
-            </a:solidFill>
-            <a:headEnd type="none" w="med" len="med"/>
-            <a:tailEnd type="none" w="med" len="med"/>
           </a:ln>
           <a:effectLst/>
         </p:spPr>
@@ -5294,88 +4163,6 @@
       </p:sp>
       <p:sp>
         <p:nvSpPr>
-          <p:cNvPr id="116" name="Freeform 115"/>
-          <p:cNvSpPr/>
-          <p:nvPr/>
-        </p:nvSpPr>
-        <p:spPr>
-          <a:xfrm>
-            <a:off x="3687515" y="2828802"/>
-            <a:ext cx="3048000" cy="203200"/>
-          </a:xfrm>
-          <a:custGeom>
-            <a:avLst/>
-            <a:gdLst>
-              <a:gd name="connsiteX0" fmla="*/ 0 w 3048000"/>
-              <a:gd name="connsiteY0" fmla="*/ 203200 h 203200"/>
-              <a:gd name="connsiteX1" fmla="*/ 221673 w 3048000"/>
-              <a:gd name="connsiteY1" fmla="*/ 0 h 203200"/>
-              <a:gd name="connsiteX2" fmla="*/ 3048000 w 3048000"/>
-              <a:gd name="connsiteY2" fmla="*/ 0 h 203200"/>
-            </a:gdLst>
-            <a:ahLst/>
-            <a:cxnLst>
-              <a:cxn ang="0">
-                <a:pos x="connsiteX0" y="connsiteY0"/>
-              </a:cxn>
-              <a:cxn ang="0">
-                <a:pos x="connsiteX1" y="connsiteY1"/>
-              </a:cxn>
-              <a:cxn ang="0">
-                <a:pos x="connsiteX2" y="connsiteY2"/>
-              </a:cxn>
-            </a:cxnLst>
-            <a:rect l="l" t="t" r="r" b="b"/>
-            <a:pathLst>
-              <a:path w="3048000" h="203200">
-                <a:moveTo>
-                  <a:pt x="0" y="203200"/>
-                </a:moveTo>
-                <a:lnTo>
-                  <a:pt x="221673" y="0"/>
-                </a:lnTo>
-                <a:lnTo>
-                  <a:pt x="3048000" y="0"/>
-                </a:lnTo>
-              </a:path>
-            </a:pathLst>
-          </a:custGeom>
-          <a:noFill/>
-          <a:ln w="19050">
-            <a:solidFill>
-              <a:schemeClr val="accent3"/>
-            </a:solidFill>
-            <a:prstDash val="solid"/>
-            <a:headEnd type="none" w="med" len="med"/>
-            <a:tailEnd type="arrow" w="med" len="med"/>
-          </a:ln>
-          <a:effectLst/>
-        </p:spPr>
-        <p:style>
-          <a:lnRef idx="1">
-            <a:schemeClr val="accent2"/>
-          </a:lnRef>
-          <a:fillRef idx="2">
-            <a:schemeClr val="accent2"/>
-          </a:fillRef>
-          <a:effectRef idx="1">
-            <a:schemeClr val="accent2"/>
-          </a:effectRef>
-          <a:fontRef idx="minor">
-            <a:schemeClr val="dk1"/>
-          </a:fontRef>
-        </p:style>
-        <p:txBody>
-          <a:bodyPr rtlCol="0" anchor="ctr"/>
-          <a:lstStyle/>
-          <a:p>
-            <a:pPr algn="ctr"/>
-            <a:endParaRPr lang="en-SG"/>
-          </a:p>
-        </p:txBody>
-      </p:sp>
-      <p:sp>
-        <p:nvSpPr>
           <p:cNvPr id="144" name="Rectangle 143"/>
           <p:cNvSpPr/>
           <p:nvPr/>
@@ -5427,60 +4214,33 @@
           </a:p>
         </p:txBody>
       </p:sp>
-      <p:sp>
-        <p:nvSpPr>
-          <p:cNvPr id="118" name="Freeform 117"/>
-          <p:cNvSpPr/>
+      <p:cxnSp>
+        <p:nvCxnSpPr>
+          <p:cNvPr id="62" name="Elbow Connector 63">
+            <a:extLst>
+              <a:ext uri="{FF2B5EF4-FFF2-40B4-BE49-F238E27FC236}">
+                <a16:creationId xmlns:a16="http://schemas.microsoft.com/office/drawing/2014/main" id="{98FF0503-2F69-D949-82F4-0A807EDCF25E}"/>
+              </a:ext>
+            </a:extLst>
+          </p:cNvPr>
+          <p:cNvCxnSpPr/>
           <p:nvPr/>
-        </p:nvSpPr>
+        </p:nvCxnSpPr>
         <p:spPr>
-          <a:xfrm flipV="1">
-            <a:off x="4114799" y="4472708"/>
-            <a:ext cx="2642195" cy="101600"/>
+          <a:xfrm rot="5400000" flipH="1" flipV="1">
+            <a:off x="2748200" y="1991577"/>
+            <a:ext cx="435738" cy="2396185"/>
           </a:xfrm>
-          <a:custGeom>
-            <a:avLst/>
-            <a:gdLst>
-              <a:gd name="connsiteX0" fmla="*/ 0 w 3048000"/>
-              <a:gd name="connsiteY0" fmla="*/ 203200 h 203200"/>
-              <a:gd name="connsiteX1" fmla="*/ 221673 w 3048000"/>
-              <a:gd name="connsiteY1" fmla="*/ 0 h 203200"/>
-              <a:gd name="connsiteX2" fmla="*/ 3048000 w 3048000"/>
-              <a:gd name="connsiteY2" fmla="*/ 0 h 203200"/>
-            </a:gdLst>
-            <a:ahLst/>
-            <a:cxnLst>
-              <a:cxn ang="0">
-                <a:pos x="connsiteX0" y="connsiteY0"/>
-              </a:cxn>
-              <a:cxn ang="0">
-                <a:pos x="connsiteX1" y="connsiteY1"/>
-              </a:cxn>
-              <a:cxn ang="0">
-                <a:pos x="connsiteX2" y="connsiteY2"/>
-              </a:cxn>
-            </a:cxnLst>
-            <a:rect l="l" t="t" r="r" b="b"/>
-            <a:pathLst>
-              <a:path w="3048000" h="203200">
-                <a:moveTo>
-                  <a:pt x="0" y="203200"/>
-                </a:moveTo>
-                <a:lnTo>
-                  <a:pt x="221673" y="0"/>
-                </a:lnTo>
-                <a:lnTo>
-                  <a:pt x="3048000" y="0"/>
-                </a:lnTo>
-              </a:path>
-            </a:pathLst>
-          </a:custGeom>
-          <a:noFill/>
+          <a:prstGeom prst="bentConnector4">
+            <a:avLst>
+              <a:gd name="adj1" fmla="val 19328"/>
+              <a:gd name="adj2" fmla="val 51911"/>
+            </a:avLst>
+          </a:prstGeom>
           <a:ln w="19050">
             <a:solidFill>
               <a:schemeClr val="accent3"/>
             </a:solidFill>
-            <a:prstDash val="sysDot"/>
             <a:headEnd type="none" w="med" len="med"/>
             <a:tailEnd type="arrow" w="med" len="med"/>
           </a:ln>
@@ -5500,12 +4260,70 @@
             <a:schemeClr val="dk1"/>
           </a:fontRef>
         </p:style>
+      </p:cxnSp>
+      <p:sp>
+        <p:nvSpPr>
+          <p:cNvPr id="64" name="Rectangle 11">
+            <a:extLst>
+              <a:ext uri="{FF2B5EF4-FFF2-40B4-BE49-F238E27FC236}">
+                <a16:creationId xmlns:a16="http://schemas.microsoft.com/office/drawing/2014/main" id="{30FF7307-3BD0-BB41-89C2-802F0038B5B4}"/>
+              </a:ext>
+            </a:extLst>
+          </p:cNvPr>
+          <p:cNvSpPr/>
+          <p:nvPr/>
+        </p:nvSpPr>
+        <p:spPr>
+          <a:xfrm>
+            <a:off x="4158425" y="2895600"/>
+            <a:ext cx="1093635" cy="236841"/>
+          </a:xfrm>
+          <a:prstGeom prst="rect">
+            <a:avLst/>
+          </a:prstGeom>
+          <a:ln w="19050">
+            <a:solidFill>
+              <a:schemeClr val="accent3"/>
+            </a:solidFill>
+          </a:ln>
+          <a:effectLst/>
+        </p:spPr>
+        <p:style>
+          <a:lnRef idx="1">
+            <a:schemeClr val="accent3"/>
+          </a:lnRef>
+          <a:fillRef idx="2">
+            <a:schemeClr val="accent3"/>
+          </a:fillRef>
+          <a:effectRef idx="1">
+            <a:schemeClr val="accent3"/>
+          </a:effectRef>
+          <a:fontRef idx="minor">
+            <a:schemeClr val="dk1"/>
+          </a:fontRef>
+        </p:style>
         <p:txBody>
           <a:bodyPr rtlCol="0" anchor="ctr"/>
           <a:lstStyle/>
           <a:p>
             <a:pPr algn="ctr"/>
-            <a:endParaRPr lang="en-SG"/>
+            <a:r>
+              <a:rPr lang="en-US" sz="1050" b="1" dirty="0" err="1">
+                <a:solidFill>
+                  <a:schemeClr val="accent3">
+                    <a:lumMod val="75000"/>
+                  </a:schemeClr>
+                </a:solidFill>
+              </a:rPr>
+              <a:t>TimeTable</a:t>
+            </a:r>
+            <a:endParaRPr lang="en-SG" sz="1050" b="1" dirty="0">
+              <a:solidFill>
+                <a:schemeClr val="accent3">
+                  <a:lumMod val="75000"/>
+                </a:schemeClr>
+              </a:solidFill>
+            </a:endParaRPr>
           </a:p>
         </p:txBody>
       </p:sp>

</xml_diff>